<commit_message>
Done is better than perfect
</commit_message>
<xml_diff>
--- a/Aario-PPT/20160520 IT - Aario's Code Style Guide.pptx
+++ b/Aario-PPT/20160520 IT - Aario's Code Style Guide.pptx
@@ -3439,6 +3439,22 @@
                 <a:latin typeface="Microsoft JhengHei" panose="020B0604030504040204" pitchFamily="34" charset="-120"/>
                 <a:ea typeface="Microsoft JhengHei" panose="020B0604030504040204" pitchFamily="34" charset="-120"/>
               </a:rPr>
+              <a:t>Done is better </a:t>
+            </a:r>
+            <a:r>
+              <a:rPr lang="en-US" altLang="zh-CN" sz="2800">
+                <a:latin typeface="Microsoft JhengHei" panose="020B0604030504040204" pitchFamily="34" charset="-120"/>
+                <a:ea typeface="Microsoft JhengHei" panose="020B0604030504040204" pitchFamily="34" charset="-120"/>
+              </a:rPr>
+              <a:t>than perfect</a:t>
+            </a:r>
+          </a:p>
+          <a:p>
+            <a:r>
+              <a:rPr lang="en-US" altLang="zh-CN" sz="2800" dirty="0">
+                <a:latin typeface="Microsoft JhengHei" panose="020B0604030504040204" pitchFamily="34" charset="-120"/>
+                <a:ea typeface="Microsoft JhengHei" panose="020B0604030504040204" pitchFamily="34" charset="-120"/>
+              </a:rPr>
               <a:t>Micro and Beautiful  	</a:t>
             </a:r>
             <a:r>
@@ -3514,28 +3530,14 @@
                 <a:latin typeface="Microsoft JhengHei" panose="020B0604030504040204" pitchFamily="34" charset="-120"/>
                 <a:ea typeface="Microsoft JhengHei" panose="020B0604030504040204" pitchFamily="34" charset="-120"/>
               </a:rPr>
-              <a:t>		</a:t>
-            </a:r>
-            <a:r>
-              <a:rPr lang="en-US" altLang="zh-CN" sz="2800">
-                <a:latin typeface="Microsoft JhengHei" panose="020B0604030504040204" pitchFamily="34" charset="-120"/>
-                <a:ea typeface="Microsoft JhengHei" panose="020B0604030504040204" pitchFamily="34" charset="-120"/>
-              </a:rPr>
-              <a:t>	 </a:t>
-            </a:r>
-            <a:r>
-              <a:rPr lang="zh-CN" altLang="en-US" sz="2000">
-                <a:latin typeface="Microsoft JhengHei" panose="020B0604030504040204" pitchFamily="34" charset="-120"/>
-                <a:ea typeface="Microsoft JhengHei" panose="020B0604030504040204" pitchFamily="34" charset="-120"/>
-              </a:rPr>
-              <a:t>模块</a:t>
+              <a:t>			 </a:t>
             </a:r>
             <a:r>
               <a:rPr lang="zh-CN" altLang="en-US" sz="2000" dirty="0">
                 <a:latin typeface="Microsoft JhengHei" panose="020B0604030504040204" pitchFamily="34" charset="-120"/>
                 <a:ea typeface="Microsoft JhengHei" panose="020B0604030504040204" pitchFamily="34" charset="-120"/>
               </a:rPr>
-              <a:t>和接口参数要“宽进严出”</a:t>
+              <a:t>模块和接口参数要“宽进严出”</a:t>
             </a:r>
             <a:endParaRPr lang="en-US" altLang="zh-CN" sz="2000" dirty="0">
               <a:latin typeface="Microsoft JhengHei" panose="020B0604030504040204" pitchFamily="34" charset="-120"/>

</xml_diff>